<commit_message>
adds some updating to a few ppts
</commit_message>
<xml_diff>
--- a/REPO_MarksCodeAndPPTs/DotNetPPTs/dotnetWeek1Ppts/D4_.NET_SOLID.pptx
+++ b/REPO_MarksCodeAndPPTs/DotNetPPTs/dotnetWeek1Ppts/D4_.NET_SOLID.pptx
@@ -372,7 +372,7 @@
           <a:p>
             <a:fld id="{9184DA70-C731-4C70-880D-CCD4705E623C}" type="datetime1">
               <a:rPr lang="en-US" smtClean="0"/>
-              <a:t>3/13/2020</a:t>
+              <a:t>4/4/2020</a:t>
             </a:fld>
             <a:endParaRPr lang="en-US" dirty="0"/>
           </a:p>
@@ -560,7 +560,7 @@
           <a:p>
             <a:fld id="{B612A279-0833-481D-8C56-F67FD0AC6C50}" type="datetime1">
               <a:rPr lang="en-US" smtClean="0"/>
-              <a:t>3/13/2020</a:t>
+              <a:t>4/4/2020</a:t>
             </a:fld>
             <a:endParaRPr lang="en-US" dirty="0"/>
           </a:p>
@@ -802,7 +802,7 @@
           <a:p>
             <a:fld id="{6587DA83-5663-4C9C-B9AA-0B40A3DAFF81}" type="datetime1">
               <a:rPr lang="en-US" smtClean="0"/>
-              <a:t>3/13/2020</a:t>
+              <a:t>4/4/2020</a:t>
             </a:fld>
             <a:endParaRPr lang="en-US" dirty="0"/>
           </a:p>
@@ -990,7 +990,7 @@
           <a:p>
             <a:fld id="{4BE1D723-8F53-4F53-90B0-1982A396982E}" type="datetime1">
               <a:rPr lang="en-US" smtClean="0"/>
-              <a:t>3/13/2020</a:t>
+              <a:t>4/4/2020</a:t>
             </a:fld>
             <a:endParaRPr lang="en-US" dirty="0"/>
           </a:p>
@@ -1363,7 +1363,7 @@
           <a:p>
             <a:fld id="{97669AF7-7BEB-44E4-9852-375E34362B5B}" type="datetime1">
               <a:rPr lang="en-US" smtClean="0"/>
-              <a:t>3/13/2020</a:t>
+              <a:t>4/4/2020</a:t>
             </a:fld>
             <a:endParaRPr lang="en-US" dirty="0"/>
           </a:p>
@@ -1618,7 +1618,7 @@
           <a:p>
             <a:fld id="{BAAAC38D-0552-4C82-B593-E6124DFADBE2}" type="datetime1">
               <a:rPr lang="en-US" smtClean="0"/>
-              <a:t>3/13/2020</a:t>
+              <a:t>4/4/2020</a:t>
             </a:fld>
             <a:endParaRPr lang="en-US" dirty="0"/>
           </a:p>
@@ -2015,7 +2015,7 @@
           <a:p>
             <a:fld id="{D9DF0F1C-5577-4ACB-BB62-DF8F3C494C7E}" type="datetime1">
               <a:rPr lang="en-US" smtClean="0"/>
-              <a:t>3/13/2020</a:t>
+              <a:t>4/4/2020</a:t>
             </a:fld>
             <a:endParaRPr lang="en-US" dirty="0"/>
           </a:p>
@@ -2151,7 +2151,7 @@
           <a:p>
             <a:fld id="{1775B394-D9F9-4F0C-B15D-605F45CB9E9F}" type="datetime1">
               <a:rPr lang="en-US" smtClean="0"/>
-              <a:t>3/13/2020</a:t>
+              <a:t>4/4/2020</a:t>
             </a:fld>
             <a:endParaRPr lang="en-US" dirty="0"/>
           </a:p>
@@ -2308,7 +2308,7 @@
           <a:p>
             <a:fld id="{39667345-2558-425A-8533-9BFDBCE15005}" type="datetime1">
               <a:rPr lang="en-US" smtClean="0"/>
-              <a:t>3/13/2020</a:t>
+              <a:t>4/4/2020</a:t>
             </a:fld>
             <a:endParaRPr lang="en-US" dirty="0"/>
           </a:p>
@@ -2637,7 +2637,7 @@
           <a:p>
             <a:fld id="{92BEA474-078D-4E9B-9B14-09A87B19DC46}" type="datetime1">
               <a:rPr lang="en-US" smtClean="0"/>
-              <a:t>3/13/2020</a:t>
+              <a:t>4/4/2020</a:t>
             </a:fld>
             <a:endParaRPr lang="en-US" dirty="0"/>
           </a:p>
@@ -2987,7 +2987,7 @@
           <a:p>
             <a:fld id="{4907D986-8816-4272-A432-0437A28A9828}" type="datetime1">
               <a:rPr lang="en-US" smtClean="0"/>
-              <a:t>3/13/2020</a:t>
+              <a:t>4/4/2020</a:t>
             </a:fld>
             <a:endParaRPr lang="en-US" dirty="0"/>
           </a:p>
@@ -3248,7 +3248,7 @@
           <a:p>
             <a:fld id="{62D6E202-B606-4609-B914-27C9371A1F6D}" type="datetime1">
               <a:rPr lang="en-US" smtClean="0"/>
-              <a:t>3/13/2020</a:t>
+              <a:t>4/4/2020</a:t>
             </a:fld>
             <a:endParaRPr lang="en-US" dirty="0"/>
           </a:p>
@@ -4359,10 +4359,15 @@
             <p:ph idx="1"/>
           </p:nvPr>
         </p:nvSpPr>
-        <p:spPr/>
+        <p:spPr>
+          <a:xfrm>
+            <a:off x="421689" y="1904261"/>
+            <a:ext cx="5042517" cy="4434396"/>
+          </a:xfrm>
+        </p:spPr>
         <p:txBody>
           <a:bodyPr>
-            <a:normAutofit/>
+            <a:normAutofit fontScale="92500" lnSpcReduction="20000"/>
           </a:bodyPr>
           <a:lstStyle/>
           <a:p>
@@ -4385,6 +4390,58 @@
           </a:p>
         </p:txBody>
       </p:sp>
+      <p:pic>
+        <p:nvPicPr>
+          <p:cNvPr id="1026" name="Picture 2">
+            <a:extLst>
+              <a:ext uri="{FF2B5EF4-FFF2-40B4-BE49-F238E27FC236}">
+                <a16:creationId xmlns:a16="http://schemas.microsoft.com/office/drawing/2014/main" id="{789CD9F1-C966-43C4-B98A-ECD8F1A20C40}"/>
+              </a:ext>
+            </a:extLst>
+          </p:cNvPr>
+          <p:cNvPicPr>
+            <a:picLocks noChangeAspect="1" noChangeArrowheads="1"/>
+          </p:cNvPicPr>
+          <p:nvPr/>
+        </p:nvPicPr>
+        <p:blipFill>
+          <a:blip r:embed="rId4">
+            <a:extLst>
+              <a:ext uri="{28A0092B-C50C-407E-A947-70E740481C1C}">
+                <a14:useLocalDpi xmlns:a14="http://schemas.microsoft.com/office/drawing/2010/main" val="0"/>
+              </a:ext>
+            </a:extLst>
+          </a:blip>
+          <a:srcRect/>
+          <a:stretch>
+            <a:fillRect/>
+          </a:stretch>
+        </p:blipFill>
+        <p:spPr bwMode="auto">
+          <a:xfrm>
+            <a:off x="5604315" y="2148114"/>
+            <a:ext cx="6357114" cy="4470399"/>
+          </a:xfrm>
+          <a:prstGeom prst="rect">
+            <a:avLst/>
+          </a:prstGeom>
+          <a:noFill/>
+          <a:effectLst>
+            <a:glow rad="63500">
+              <a:schemeClr val="accent2"/>
+            </a:glow>
+          </a:effectLst>
+          <a:extLst>
+            <a:ext uri="{909E8E84-426E-40DD-AFC4-6F175D3DCCD1}">
+              <a14:hiddenFill xmlns:a14="http://schemas.microsoft.com/office/drawing/2010/main">
+                <a:solidFill>
+                  <a:srgbClr val="FFFFFF"/>
+                </a:solidFill>
+              </a14:hiddenFill>
+            </a:ext>
+          </a:extLst>
+        </p:spPr>
+      </p:pic>
     </p:spTree>
     <p:extLst>
       <p:ext uri="{BB962C8B-B14F-4D97-AF65-F5344CB8AC3E}">

</xml_diff>